<commit_message>
last version of the content
</commit_message>
<xml_diff>
--- a/Mastering Supabase Session1.pptx
+++ b/Mastering Supabase Session1.pptx
@@ -45,7 +45,7 @@
       <p:regular r:id="rId32"/>
     </p:embeddedFont>
     <p:embeddedFont>
-      <p:font typeface="Poppins" panose="00000400000000000000"/>
+      <p:font typeface="Poppins"/>
       <p:regular r:id="rId33"/>
       <p:italic r:id="rId34"/>
       <p:boldItalic r:id="rId35"/>
@@ -53,10 +53,11 @@
     <p:embeddedFont>
       <p:font typeface="Homemade Apple" panose="02000000000000000000"/>
       <p:regular r:id="rId36"/>
+      <p:boldItalic r:id="rId37"/>
     </p:embeddedFont>
     <p:embeddedFont>
       <p:font typeface="Aldhabi" panose="01000000000000000000" charset="0"/>
-      <p:regular r:id="rId37"/>
+      <p:regular r:id="rId38"/>
     </p:embeddedFont>
   </p:embeddedFontLst>
   <p:defaultTextStyle>
@@ -6425,10 +6426,10 @@
                   <a:solidFill>
                     <a:srgbClr val="3F3F3F"/>
                   </a:solidFill>
-                  <a:latin typeface="Poppins" panose="00000400000000000000"/>
-                  <a:ea typeface="Poppins" panose="00000400000000000000"/>
-                  <a:cs typeface="Poppins" panose="00000400000000000000"/>
-                  <a:sym typeface="Poppins" panose="00000400000000000000"/>
+                  <a:latin typeface="Poppins"/>
+                  <a:ea typeface="Poppins"/>
+                  <a:cs typeface="Poppins"/>
+                  <a:sym typeface="Poppins"/>
                 </a:rPr>
                 <a:t>Free </a:t>
               </a:r>
@@ -6437,10 +6438,10 @@
                   <a:solidFill>
                     <a:srgbClr val="3F3F3F"/>
                   </a:solidFill>
-                  <a:latin typeface="Poppins" panose="00000400000000000000"/>
-                  <a:ea typeface="Poppins" panose="00000400000000000000"/>
-                  <a:cs typeface="Poppins" panose="00000400000000000000"/>
-                  <a:sym typeface="Poppins" panose="00000400000000000000"/>
+                  <a:latin typeface="Poppins"/>
+                  <a:ea typeface="Poppins"/>
+                  <a:cs typeface="Poppins"/>
+                  <a:sym typeface="Poppins"/>
                 </a:rPr>
                 <a:t>themes and templates for </a:t>
               </a:r>
@@ -6449,10 +6450,10 @@
                   <a:solidFill>
                     <a:srgbClr val="3F3F3F"/>
                   </a:solidFill>
-                  <a:latin typeface="Poppins" panose="00000400000000000000"/>
-                  <a:ea typeface="Poppins" panose="00000400000000000000"/>
-                  <a:cs typeface="Poppins" panose="00000400000000000000"/>
-                  <a:sym typeface="Poppins" panose="00000400000000000000"/>
+                  <a:latin typeface="Poppins"/>
+                  <a:ea typeface="Poppins"/>
+                  <a:cs typeface="Poppins"/>
+                  <a:sym typeface="Poppins"/>
                 </a:rPr>
                 <a:t>Google Slides</a:t>
               </a:r>
@@ -6461,10 +6462,10 @@
                   <a:solidFill>
                     <a:srgbClr val="3F3F3F"/>
                   </a:solidFill>
-                  <a:latin typeface="Poppins" panose="00000400000000000000"/>
-                  <a:ea typeface="Poppins" panose="00000400000000000000"/>
-                  <a:cs typeface="Poppins" panose="00000400000000000000"/>
-                  <a:sym typeface="Poppins" panose="00000400000000000000"/>
+                  <a:latin typeface="Poppins"/>
+                  <a:ea typeface="Poppins"/>
+                  <a:cs typeface="Poppins"/>
+                  <a:sym typeface="Poppins"/>
                 </a:rPr>
                 <a:t> or </a:t>
               </a:r>
@@ -6473,10 +6474,10 @@
                   <a:solidFill>
                     <a:srgbClr val="3F3F3F"/>
                   </a:solidFill>
-                  <a:latin typeface="Poppins" panose="00000400000000000000"/>
-                  <a:ea typeface="Poppins" panose="00000400000000000000"/>
-                  <a:cs typeface="Poppins" panose="00000400000000000000"/>
-                  <a:sym typeface="Poppins" panose="00000400000000000000"/>
+                  <a:latin typeface="Poppins"/>
+                  <a:ea typeface="Poppins"/>
+                  <a:cs typeface="Poppins"/>
+                  <a:sym typeface="Poppins"/>
                 </a:rPr>
                 <a:t>PowerPoint</a:t>
               </a:r>
@@ -6484,10 +6485,10 @@
                 <a:solidFill>
                   <a:srgbClr val="3F3F3F"/>
                 </a:solidFill>
-                <a:latin typeface="Poppins" panose="00000400000000000000"/>
-                <a:ea typeface="Poppins" panose="00000400000000000000"/>
-                <a:cs typeface="Poppins" panose="00000400000000000000"/>
-                <a:sym typeface="Poppins" panose="00000400000000000000"/>
+                <a:latin typeface="Poppins"/>
+                <a:ea typeface="Poppins"/>
+                <a:cs typeface="Poppins"/>
+                <a:sym typeface="Poppins"/>
               </a:endParaRPr>
             </a:p>
             <a:p>
@@ -6504,10 +6505,10 @@
                 <a:solidFill>
                   <a:srgbClr val="3F3F3F"/>
                 </a:solidFill>
-                <a:latin typeface="Poppins" panose="00000400000000000000"/>
-                <a:ea typeface="Poppins" panose="00000400000000000000"/>
-                <a:cs typeface="Poppins" panose="00000400000000000000"/>
-                <a:sym typeface="Poppins" panose="00000400000000000000"/>
+                <a:latin typeface="Poppins"/>
+                <a:ea typeface="Poppins"/>
+                <a:cs typeface="Poppins"/>
+                <a:sym typeface="Poppins"/>
               </a:endParaRPr>
             </a:p>
             <a:p>
@@ -6524,10 +6525,10 @@
                 <a:solidFill>
                   <a:srgbClr val="3F3F3F"/>
                 </a:solidFill>
-                <a:latin typeface="Poppins" panose="00000400000000000000"/>
-                <a:ea typeface="Poppins" panose="00000400000000000000"/>
-                <a:cs typeface="Poppins" panose="00000400000000000000"/>
-                <a:sym typeface="Poppins" panose="00000400000000000000"/>
+                <a:latin typeface="Poppins"/>
+                <a:ea typeface="Poppins"/>
+                <a:cs typeface="Poppins"/>
+                <a:sym typeface="Poppins"/>
               </a:endParaRPr>
             </a:p>
             <a:p>
@@ -6545,10 +6546,10 @@
                   <a:solidFill>
                     <a:srgbClr val="FFCB25"/>
                   </a:solidFill>
-                  <a:latin typeface="Poppins" panose="00000400000000000000"/>
-                  <a:ea typeface="Poppins" panose="00000400000000000000"/>
-                  <a:cs typeface="Poppins" panose="00000400000000000000"/>
-                  <a:sym typeface="Poppins" panose="00000400000000000000"/>
+                  <a:latin typeface="Poppins"/>
+                  <a:ea typeface="Poppins"/>
+                  <a:cs typeface="Poppins"/>
+                  <a:sym typeface="Poppins"/>
                 </a:rPr>
                 <a:t>NOT to be sold as is or modified!</a:t>
               </a:r>
@@ -6556,10 +6557,10 @@
                 <a:solidFill>
                   <a:srgbClr val="FFCB25"/>
                 </a:solidFill>
-                <a:latin typeface="Poppins" panose="00000400000000000000"/>
-                <a:ea typeface="Poppins" panose="00000400000000000000"/>
-                <a:cs typeface="Poppins" panose="00000400000000000000"/>
-                <a:sym typeface="Poppins" panose="00000400000000000000"/>
+                <a:latin typeface="Poppins"/>
+                <a:ea typeface="Poppins"/>
+                <a:cs typeface="Poppins"/>
+                <a:sym typeface="Poppins"/>
               </a:endParaRPr>
             </a:p>
             <a:p>
@@ -6577,10 +6578,10 @@
                   <a:solidFill>
                     <a:srgbClr val="3F3F3F"/>
                   </a:solidFill>
-                  <a:latin typeface="Poppins" panose="00000400000000000000"/>
-                  <a:ea typeface="Poppins" panose="00000400000000000000"/>
-                  <a:cs typeface="Poppins" panose="00000400000000000000"/>
-                  <a:sym typeface="Poppins" panose="00000400000000000000"/>
+                  <a:latin typeface="Poppins"/>
+                  <a:ea typeface="Poppins"/>
+                  <a:cs typeface="Poppins"/>
+                  <a:sym typeface="Poppins"/>
                 </a:rPr>
                 <a:t>Read </a:t>
               </a:r>
@@ -6589,10 +6590,10 @@
                   <a:solidFill>
                     <a:srgbClr val="3F3F3F"/>
                   </a:solidFill>
-                  <a:latin typeface="Poppins" panose="00000400000000000000"/>
-                  <a:ea typeface="Poppins" panose="00000400000000000000"/>
-                  <a:cs typeface="Poppins" panose="00000400000000000000"/>
-                  <a:sym typeface="Poppins" panose="00000400000000000000"/>
+                  <a:latin typeface="Poppins"/>
+                  <a:ea typeface="Poppins"/>
+                  <a:cs typeface="Poppins"/>
+                  <a:sym typeface="Poppins"/>
                   <a:hlinkClick r:id="rId2"/>
                 </a:rPr>
                 <a:t>FAQ</a:t>
@@ -6602,10 +6603,10 @@
                   <a:solidFill>
                     <a:srgbClr val="FFCB25"/>
                   </a:solidFill>
-                  <a:latin typeface="Poppins" panose="00000400000000000000"/>
-                  <a:ea typeface="Poppins" panose="00000400000000000000"/>
-                  <a:cs typeface="Poppins" panose="00000400000000000000"/>
-                  <a:sym typeface="Poppins" panose="00000400000000000000"/>
+                  <a:latin typeface="Poppins"/>
+                  <a:ea typeface="Poppins"/>
+                  <a:cs typeface="Poppins"/>
+                  <a:sym typeface="Poppins"/>
                 </a:rPr>
                 <a:t> </a:t>
               </a:r>
@@ -6614,10 +6615,10 @@
                   <a:solidFill>
                     <a:srgbClr val="3F3F3F"/>
                   </a:solidFill>
-                  <a:latin typeface="Poppins" panose="00000400000000000000"/>
-                  <a:ea typeface="Poppins" panose="00000400000000000000"/>
-                  <a:cs typeface="Poppins" panose="00000400000000000000"/>
-                  <a:sym typeface="Poppins" panose="00000400000000000000"/>
+                  <a:latin typeface="Poppins"/>
+                  <a:ea typeface="Poppins"/>
+                  <a:cs typeface="Poppins"/>
+                  <a:sym typeface="Poppins"/>
                 </a:rPr>
                 <a:t>on slidesmania.com</a:t>
               </a:r>
@@ -6625,10 +6626,10 @@
                 <a:solidFill>
                   <a:srgbClr val="3F3F3F"/>
                 </a:solidFill>
-                <a:latin typeface="Poppins" panose="00000400000000000000"/>
-                <a:ea typeface="Poppins" panose="00000400000000000000"/>
-                <a:cs typeface="Poppins" panose="00000400000000000000"/>
-                <a:sym typeface="Poppins" panose="00000400000000000000"/>
+                <a:latin typeface="Poppins"/>
+                <a:ea typeface="Poppins"/>
+                <a:cs typeface="Poppins"/>
+                <a:sym typeface="Poppins"/>
               </a:endParaRPr>
             </a:p>
             <a:p>
@@ -6646,10 +6647,10 @@
                   <a:solidFill>
                     <a:srgbClr val="3F3F3F"/>
                   </a:solidFill>
-                  <a:latin typeface="Poppins" panose="00000400000000000000"/>
-                  <a:ea typeface="Poppins" panose="00000400000000000000"/>
-                  <a:cs typeface="Poppins" panose="00000400000000000000"/>
-                  <a:sym typeface="Poppins" panose="00000400000000000000"/>
+                  <a:latin typeface="Poppins"/>
+                  <a:ea typeface="Poppins"/>
+                  <a:cs typeface="Poppins"/>
+                  <a:sym typeface="Poppins"/>
                 </a:rPr>
                 <a:t>Do not remove the slidesmania.com text on the sides.</a:t>
               </a:r>
@@ -6657,10 +6658,10 @@
                 <a:solidFill>
                   <a:srgbClr val="3F3F3F"/>
                 </a:solidFill>
-                <a:latin typeface="Poppins" panose="00000400000000000000"/>
-                <a:ea typeface="Poppins" panose="00000400000000000000"/>
-                <a:cs typeface="Poppins" panose="00000400000000000000"/>
-                <a:sym typeface="Poppins" panose="00000400000000000000"/>
+                <a:latin typeface="Poppins"/>
+                <a:ea typeface="Poppins"/>
+                <a:cs typeface="Poppins"/>
+                <a:sym typeface="Poppins"/>
               </a:endParaRPr>
             </a:p>
           </p:txBody>
@@ -19915,7 +19916,7 @@
             </a:pPr>
             <a:r>
               <a:rPr lang="en-US" altLang="en-GB" sz="10000"/>
-              <a:t>See you next sesson</a:t>
+              <a:t>See you next session</a:t>
             </a:r>
             <a:r>
               <a:rPr lang="en-GB" sz="10000"/>

</xml_diff>